<commit_message>
add bill's ppt, and also add contingency table's plot. Lastly, i also update bill.R
</commit_message>
<xml_diff>
--- a/docs/1082_datascience_FP_group3.pptx
+++ b/docs/1082_datascience_FP_group3.pptx
@@ -10,11 +10,12 @@
     <p:sldId id="258" r:id="rId4"/>
     <p:sldId id="265" r:id="rId5"/>
     <p:sldId id="259" r:id="rId6"/>
-    <p:sldId id="260" r:id="rId7"/>
-    <p:sldId id="264" r:id="rId8"/>
-    <p:sldId id="261" r:id="rId9"/>
-    <p:sldId id="262" r:id="rId10"/>
-    <p:sldId id="263" r:id="rId11"/>
+    <p:sldId id="266" r:id="rId7"/>
+    <p:sldId id="260" r:id="rId8"/>
+    <p:sldId id="264" r:id="rId9"/>
+    <p:sldId id="261" r:id="rId10"/>
+    <p:sldId id="262" r:id="rId11"/>
+    <p:sldId id="263" r:id="rId12"/>
   </p:sldIdLst>
   <p:sldSz cx="12192000" cy="6858000"/>
   <p:notesSz cx="6858000" cy="9144000"/>
@@ -3683,6 +3684,98 @@
           <p:cNvPr id="2" name="Title 1">
             <a:extLst>
               <a:ext uri="{FF2B5EF4-FFF2-40B4-BE49-F238E27FC236}">
+                <a16:creationId xmlns:a16="http://schemas.microsoft.com/office/drawing/2014/main" id="{B314D980-B141-DB4D-9B0A-7AA3150AF5F4}"/>
+              </a:ext>
+            </a:extLst>
+          </p:cNvPr>
+          <p:cNvSpPr>
+            <a:spLocks noGrp="1"/>
+          </p:cNvSpPr>
+          <p:nvPr>
+            <p:ph type="title"/>
+          </p:nvPr>
+        </p:nvSpPr>
+        <p:spPr/>
+        <p:txBody>
+          <a:bodyPr/>
+          <a:lstStyle/>
+          <a:p>
+            <a:r>
+              <a:rPr lang="zh-CN" altLang="en-US" b="1" dirty="0"/>
+              <a:t>程式</a:t>
+            </a:r>
+            <a:r>
+              <a:rPr lang="zh-TW" altLang="en-US" b="1" dirty="0"/>
+              <a:t> </a:t>
+            </a:r>
+            <a:r>
+              <a:rPr lang="en-US" altLang="zh-TW" b="1" dirty="0"/>
+              <a:t>Demo</a:t>
+            </a:r>
+            <a:endParaRPr lang="en-TW" b="1" dirty="0"/>
+          </a:p>
+        </p:txBody>
+      </p:sp>
+      <p:sp>
+        <p:nvSpPr>
+          <p:cNvPr id="3" name="Content Placeholder 2">
+            <a:extLst>
+              <a:ext uri="{FF2B5EF4-FFF2-40B4-BE49-F238E27FC236}">
+                <a16:creationId xmlns:a16="http://schemas.microsoft.com/office/drawing/2014/main" id="{97F7C985-F283-3F42-A334-D18BFB328D95}"/>
+              </a:ext>
+            </a:extLst>
+          </p:cNvPr>
+          <p:cNvSpPr>
+            <a:spLocks noGrp="1"/>
+          </p:cNvSpPr>
+          <p:nvPr>
+            <p:ph idx="1"/>
+          </p:nvPr>
+        </p:nvSpPr>
+        <p:spPr/>
+        <p:txBody>
+          <a:bodyPr/>
+          <a:lstStyle/>
+          <a:p>
+            <a:endParaRPr lang="en-TW"/>
+          </a:p>
+        </p:txBody>
+      </p:sp>
+    </p:spTree>
+    <p:extLst>
+      <p:ext uri="{BB962C8B-B14F-4D97-AF65-F5344CB8AC3E}">
+        <p14:creationId xmlns:p14="http://schemas.microsoft.com/office/powerpoint/2010/main" val="4011282561"/>
+      </p:ext>
+    </p:extLst>
+  </p:cSld>
+  <p:clrMapOvr>
+    <a:masterClrMapping/>
+  </p:clrMapOvr>
+</p:sld>
+</file>
+
+<file path=ppt/slides/slide11.xml><?xml version="1.0" encoding="utf-8"?>
+<p:sld xmlns:a="http://schemas.openxmlformats.org/drawingml/2006/main" xmlns:r="http://schemas.openxmlformats.org/officeDocument/2006/relationships" xmlns:p="http://schemas.openxmlformats.org/presentationml/2006/main">
+  <p:cSld>
+    <p:spTree>
+      <p:nvGrpSpPr>
+        <p:cNvPr id="1" name=""/>
+        <p:cNvGrpSpPr/>
+        <p:nvPr/>
+      </p:nvGrpSpPr>
+      <p:grpSpPr>
+        <a:xfrm>
+          <a:off x="0" y="0"/>
+          <a:ext cx="0" cy="0"/>
+          <a:chOff x="0" y="0"/>
+          <a:chExt cx="0" cy="0"/>
+        </a:xfrm>
+      </p:grpSpPr>
+      <p:sp>
+        <p:nvSpPr>
+          <p:cNvPr id="2" name="Title 1">
+            <a:extLst>
+              <a:ext uri="{FF2B5EF4-FFF2-40B4-BE49-F238E27FC236}">
                 <a16:creationId xmlns:a16="http://schemas.microsoft.com/office/drawing/2014/main" id="{B585197A-2FBB-E840-94FF-E9E7C4321FC7}"/>
               </a:ext>
             </a:extLst>
@@ -4128,14 +4221,16 @@
         </p:nvSpPr>
         <p:spPr/>
         <p:txBody>
-          <a:bodyPr/>
+          <a:bodyPr>
+            <a:normAutofit/>
+          </a:bodyPr>
           <a:lstStyle/>
           <a:p>
             <a:r>
               <a:rPr lang="zh-CN" altLang="en-US" b="1" dirty="0"/>
               <a:t>資料輸入與輸出</a:t>
             </a:r>
-            <a:endParaRPr lang="en-US" altLang="zh-CN" b="1" dirty="0"/>
+            <a:endParaRPr lang="en-US" altLang="zh-CN" sz="2000" b="1" dirty="0"/>
           </a:p>
         </p:txBody>
       </p:sp>
@@ -4155,12 +4250,19 @@
             <p:ph idx="1"/>
           </p:nvPr>
         </p:nvSpPr>
-        <p:spPr/>
-        <p:txBody>
-          <a:bodyPr/>
-          <a:lstStyle/>
-          <a:p>
-            <a:endParaRPr lang="en-TW"/>
+        <p:spPr>
+          <a:xfrm>
+            <a:off x="1451579" y="2015732"/>
+            <a:ext cx="9603275" cy="3950062"/>
+          </a:xfrm>
+        </p:spPr>
+        <p:txBody>
+          <a:bodyPr>
+            <a:normAutofit/>
+          </a:bodyPr>
+          <a:lstStyle/>
+          <a:p>
+            <a:endParaRPr lang="en-US" altLang="zh-CN" dirty="0"/>
           </a:p>
         </p:txBody>
       </p:sp>
@@ -4219,17 +4321,7 @@
           <a:p>
             <a:r>
               <a:rPr lang="zh-CN" altLang="en-US" b="1" dirty="0"/>
-              <a:t>實驗方法</a:t>
-            </a:r>
-            <a:br>
-              <a:rPr lang="en-US" altLang="zh-CN" b="1" dirty="0"/>
-            </a:br>
-            <a:br>
-              <a:rPr lang="en-US" altLang="zh-CN" sz="1300" b="1" dirty="0"/>
-            </a:br>
-            <a:r>
-              <a:rPr lang="zh-CN" altLang="en-US" sz="2000" b="1" dirty="0"/>
-              <a:t>資料前處理</a:t>
+              <a:t>資料輸入與輸出</a:t>
             </a:r>
             <a:endParaRPr lang="en-US" altLang="zh-CN" sz="2000" b="1" dirty="0"/>
           </a:p>
@@ -4253,17 +4345,22 @@
         </p:nvSpPr>
         <p:spPr/>
         <p:txBody>
-          <a:bodyPr/>
-          <a:lstStyle/>
-          <a:p>
-            <a:endParaRPr lang="en-TW"/>
+          <a:bodyPr>
+            <a:normAutofit/>
+          </a:bodyPr>
+          <a:lstStyle/>
+          <a:p>
+            <a:pPr marL="0" indent="0">
+              <a:buNone/>
+            </a:pPr>
+            <a:endParaRPr lang="en-TW" dirty="0"/>
           </a:p>
         </p:txBody>
       </p:sp>
     </p:spTree>
     <p:extLst>
       <p:ext uri="{BB962C8B-B14F-4D97-AF65-F5344CB8AC3E}">
-        <p14:creationId xmlns:p14="http://schemas.microsoft.com/office/powerpoint/2010/main" val="1557008179"/>
+        <p14:creationId xmlns:p14="http://schemas.microsoft.com/office/powerpoint/2010/main" val="780949027"/>
       </p:ext>
     </p:extLst>
   </p:cSld>
@@ -4292,6 +4389,47 @@
       </p:grpSpPr>
       <p:sp>
         <p:nvSpPr>
+          <p:cNvPr id="2" name="Title 1">
+            <a:extLst>
+              <a:ext uri="{FF2B5EF4-FFF2-40B4-BE49-F238E27FC236}">
+                <a16:creationId xmlns:a16="http://schemas.microsoft.com/office/drawing/2014/main" id="{B314D980-B141-DB4D-9B0A-7AA3150AF5F4}"/>
+              </a:ext>
+            </a:extLst>
+          </p:cNvPr>
+          <p:cNvSpPr>
+            <a:spLocks noGrp="1"/>
+          </p:cNvSpPr>
+          <p:nvPr>
+            <p:ph type="title"/>
+          </p:nvPr>
+        </p:nvSpPr>
+        <p:spPr/>
+        <p:txBody>
+          <a:bodyPr>
+            <a:normAutofit/>
+          </a:bodyPr>
+          <a:lstStyle/>
+          <a:p>
+            <a:r>
+              <a:rPr lang="zh-CN" altLang="en-US" b="1" dirty="0"/>
+              <a:t>實驗方法</a:t>
+            </a:r>
+            <a:br>
+              <a:rPr lang="en-US" altLang="zh-CN" b="1" dirty="0"/>
+            </a:br>
+            <a:br>
+              <a:rPr lang="en-US" altLang="zh-CN" sz="1300" b="1" dirty="0"/>
+            </a:br>
+            <a:r>
+              <a:rPr lang="zh-CN" altLang="en-US" sz="2000" b="1" dirty="0"/>
+              <a:t>資料前處理</a:t>
+            </a:r>
+            <a:endParaRPr lang="en-US" altLang="zh-CN" sz="2000" b="1" dirty="0"/>
+          </a:p>
+        </p:txBody>
+      </p:sp>
+      <p:sp>
+        <p:nvSpPr>
           <p:cNvPr id="3" name="Content Placeholder 2">
             <a:extLst>
               <a:ext uri="{FF2B5EF4-FFF2-40B4-BE49-F238E27FC236}">
@@ -4315,56 +4453,10 @@
           </a:p>
         </p:txBody>
       </p:sp>
-      <p:sp>
-        <p:nvSpPr>
-          <p:cNvPr id="7" name="Title 1">
-            <a:extLst>
-              <a:ext uri="{FF2B5EF4-FFF2-40B4-BE49-F238E27FC236}">
-                <a16:creationId xmlns:a16="http://schemas.microsoft.com/office/drawing/2014/main" id="{00ADFE7D-9DD7-4F4B-A3EE-AC01CF7FBC49}"/>
-              </a:ext>
-            </a:extLst>
-          </p:cNvPr>
-          <p:cNvSpPr>
-            <a:spLocks noGrp="1"/>
-          </p:cNvSpPr>
-          <p:nvPr>
-            <p:ph type="title"/>
-          </p:nvPr>
-        </p:nvSpPr>
-        <p:spPr>
-          <a:xfrm>
-            <a:off x="1451579" y="804519"/>
-            <a:ext cx="9603275" cy="1049235"/>
-          </a:xfrm>
-        </p:spPr>
-        <p:txBody>
-          <a:bodyPr>
-            <a:normAutofit/>
-          </a:bodyPr>
-          <a:lstStyle/>
-          <a:p>
-            <a:r>
-              <a:rPr lang="zh-CN" altLang="en-US" b="1" dirty="0"/>
-              <a:t>實驗方法</a:t>
-            </a:r>
-            <a:br>
-              <a:rPr lang="en-US" altLang="zh-CN" b="1" dirty="0"/>
-            </a:br>
-            <a:br>
-              <a:rPr lang="en-US" altLang="zh-CN" sz="1300" b="1" dirty="0"/>
-            </a:br>
-            <a:r>
-              <a:rPr lang="zh-CN" altLang="en-US" sz="2000" b="1" dirty="0"/>
-              <a:t>模型</a:t>
-            </a:r>
-            <a:endParaRPr lang="en-US" altLang="zh-CN" sz="2000" b="1" dirty="0"/>
-          </a:p>
-        </p:txBody>
-      </p:sp>
     </p:spTree>
     <p:extLst>
       <p:ext uri="{BB962C8B-B14F-4D97-AF65-F5344CB8AC3E}">
-        <p14:creationId xmlns:p14="http://schemas.microsoft.com/office/powerpoint/2010/main" val="123671104"/>
+        <p14:creationId xmlns:p14="http://schemas.microsoft.com/office/powerpoint/2010/main" val="1557008179"/>
       </p:ext>
     </p:extLst>
   </p:cSld>
@@ -4393,35 +4485,6 @@
       </p:grpSpPr>
       <p:sp>
         <p:nvSpPr>
-          <p:cNvPr id="2" name="Title 1">
-            <a:extLst>
-              <a:ext uri="{FF2B5EF4-FFF2-40B4-BE49-F238E27FC236}">
-                <a16:creationId xmlns:a16="http://schemas.microsoft.com/office/drawing/2014/main" id="{B314D980-B141-DB4D-9B0A-7AA3150AF5F4}"/>
-              </a:ext>
-            </a:extLst>
-          </p:cNvPr>
-          <p:cNvSpPr>
-            <a:spLocks noGrp="1"/>
-          </p:cNvSpPr>
-          <p:nvPr>
-            <p:ph type="title"/>
-          </p:nvPr>
-        </p:nvSpPr>
-        <p:spPr/>
-        <p:txBody>
-          <a:bodyPr/>
-          <a:lstStyle/>
-          <a:p>
-            <a:r>
-              <a:rPr lang="zh-CN" altLang="en-US" b="1" dirty="0"/>
-              <a:t>實驗結果</a:t>
-            </a:r>
-            <a:endParaRPr lang="en-US" altLang="zh-CN" b="1" dirty="0"/>
-          </a:p>
-        </p:txBody>
-      </p:sp>
-      <p:sp>
-        <p:nvSpPr>
           <p:cNvPr id="3" name="Content Placeholder 2">
             <a:extLst>
               <a:ext uri="{FF2B5EF4-FFF2-40B4-BE49-F238E27FC236}">
@@ -4445,10 +4508,56 @@
           </a:p>
         </p:txBody>
       </p:sp>
+      <p:sp>
+        <p:nvSpPr>
+          <p:cNvPr id="7" name="Title 1">
+            <a:extLst>
+              <a:ext uri="{FF2B5EF4-FFF2-40B4-BE49-F238E27FC236}">
+                <a16:creationId xmlns:a16="http://schemas.microsoft.com/office/drawing/2014/main" id="{00ADFE7D-9DD7-4F4B-A3EE-AC01CF7FBC49}"/>
+              </a:ext>
+            </a:extLst>
+          </p:cNvPr>
+          <p:cNvSpPr>
+            <a:spLocks noGrp="1"/>
+          </p:cNvSpPr>
+          <p:nvPr>
+            <p:ph type="title"/>
+          </p:nvPr>
+        </p:nvSpPr>
+        <p:spPr>
+          <a:xfrm>
+            <a:off x="1451579" y="804519"/>
+            <a:ext cx="9603275" cy="1049235"/>
+          </a:xfrm>
+        </p:spPr>
+        <p:txBody>
+          <a:bodyPr>
+            <a:normAutofit/>
+          </a:bodyPr>
+          <a:lstStyle/>
+          <a:p>
+            <a:r>
+              <a:rPr lang="zh-CN" altLang="en-US" b="1" dirty="0"/>
+              <a:t>實驗方法</a:t>
+            </a:r>
+            <a:br>
+              <a:rPr lang="en-US" altLang="zh-CN" b="1" dirty="0"/>
+            </a:br>
+            <a:br>
+              <a:rPr lang="en-US" altLang="zh-CN" sz="1300" b="1" dirty="0"/>
+            </a:br>
+            <a:r>
+              <a:rPr lang="zh-CN" altLang="en-US" sz="2000" b="1" dirty="0"/>
+              <a:t>模型</a:t>
+            </a:r>
+            <a:endParaRPr lang="en-US" altLang="zh-CN" sz="2000" b="1" dirty="0"/>
+          </a:p>
+        </p:txBody>
+      </p:sp>
     </p:spTree>
     <p:extLst>
       <p:ext uri="{BB962C8B-B14F-4D97-AF65-F5344CB8AC3E}">
-        <p14:creationId xmlns:p14="http://schemas.microsoft.com/office/powerpoint/2010/main" val="1293020702"/>
+        <p14:creationId xmlns:p14="http://schemas.microsoft.com/office/powerpoint/2010/main" val="123671104"/>
       </p:ext>
     </p:extLst>
   </p:cSld>
@@ -4498,17 +4607,9 @@
           <a:p>
             <a:r>
               <a:rPr lang="zh-CN" altLang="en-US" b="1" dirty="0"/>
-              <a:t>程式</a:t>
-            </a:r>
-            <a:r>
-              <a:rPr lang="zh-TW" altLang="en-US" b="1" dirty="0"/>
-              <a:t> </a:t>
-            </a:r>
-            <a:r>
-              <a:rPr lang="en-US" altLang="zh-TW" b="1" dirty="0"/>
-              <a:t>Demo</a:t>
-            </a:r>
-            <a:endParaRPr lang="en-TW" b="1" dirty="0"/>
+              <a:t>實驗結果</a:t>
+            </a:r>
+            <a:endParaRPr lang="en-US" altLang="zh-CN" b="1" dirty="0"/>
           </a:p>
         </p:txBody>
       </p:sp>
@@ -4540,7 +4641,7 @@
     </p:spTree>
     <p:extLst>
       <p:ext uri="{BB962C8B-B14F-4D97-AF65-F5344CB8AC3E}">
-        <p14:creationId xmlns:p14="http://schemas.microsoft.com/office/powerpoint/2010/main" val="4011282561"/>
+        <p14:creationId xmlns:p14="http://schemas.microsoft.com/office/powerpoint/2010/main" val="1293020702"/>
       </p:ext>
     </p:extLst>
   </p:cSld>

</xml_diff>